<commit_message>
added info about ressource import
</commit_message>
<xml_diff>
--- a/Modul_07_TF_Backends/Backends.pptx
+++ b/Modul_07_TF_Backends/Backends.pptx
@@ -206,7 +206,7 @@
           <a:p>
             <a:fld id="{E9DAB8B5-B9A3-426D-91D9-D7966B0F2B79}" type="datetimeFigureOut">
               <a:rPr lang="de-DE" smtClean="0"/>
-              <a:t>14.11.2021</a:t>
+              <a:t>15.11.2021</a:t>
             </a:fld>
             <a:endParaRPr lang="de-DE"/>
           </a:p>
@@ -1549,7 +1549,7 @@
           <a:p>
             <a:fld id="{6CBA03CC-73C5-46A8-8DFB-B5DC4577D8E2}" type="datetimeFigureOut">
               <a:rPr lang="de-DE" smtClean="0"/>
-              <a:t>14.11.2021</a:t>
+              <a:t>15.11.2021</a:t>
             </a:fld>
             <a:endParaRPr lang="de-DE"/>
           </a:p>
@@ -1719,7 +1719,7 @@
           <a:p>
             <a:fld id="{6CBA03CC-73C5-46A8-8DFB-B5DC4577D8E2}" type="datetimeFigureOut">
               <a:rPr lang="de-DE" smtClean="0"/>
-              <a:t>14.11.2021</a:t>
+              <a:t>15.11.2021</a:t>
             </a:fld>
             <a:endParaRPr lang="de-DE"/>
           </a:p>
@@ -1899,7 +1899,7 @@
           <a:p>
             <a:fld id="{6CBA03CC-73C5-46A8-8DFB-B5DC4577D8E2}" type="datetimeFigureOut">
               <a:rPr lang="de-DE" smtClean="0"/>
-              <a:t>14.11.2021</a:t>
+              <a:t>15.11.2021</a:t>
             </a:fld>
             <a:endParaRPr lang="de-DE"/>
           </a:p>
@@ -2069,7 +2069,7 @@
           <a:p>
             <a:fld id="{6CBA03CC-73C5-46A8-8DFB-B5DC4577D8E2}" type="datetimeFigureOut">
               <a:rPr lang="de-DE" smtClean="0"/>
-              <a:t>14.11.2021</a:t>
+              <a:t>15.11.2021</a:t>
             </a:fld>
             <a:endParaRPr lang="de-DE"/>
           </a:p>
@@ -2315,7 +2315,7 @@
           <a:p>
             <a:fld id="{6CBA03CC-73C5-46A8-8DFB-B5DC4577D8E2}" type="datetimeFigureOut">
               <a:rPr lang="de-DE" smtClean="0"/>
-              <a:t>14.11.2021</a:t>
+              <a:t>15.11.2021</a:t>
             </a:fld>
             <a:endParaRPr lang="de-DE"/>
           </a:p>
@@ -2547,7 +2547,7 @@
           <a:p>
             <a:fld id="{6CBA03CC-73C5-46A8-8DFB-B5DC4577D8E2}" type="datetimeFigureOut">
               <a:rPr lang="de-DE" smtClean="0"/>
-              <a:t>14.11.2021</a:t>
+              <a:t>15.11.2021</a:t>
             </a:fld>
             <a:endParaRPr lang="de-DE"/>
           </a:p>
@@ -2914,7 +2914,7 @@
           <a:p>
             <a:fld id="{6CBA03CC-73C5-46A8-8DFB-B5DC4577D8E2}" type="datetimeFigureOut">
               <a:rPr lang="de-DE" smtClean="0"/>
-              <a:t>14.11.2021</a:t>
+              <a:t>15.11.2021</a:t>
             </a:fld>
             <a:endParaRPr lang="de-DE"/>
           </a:p>
@@ -3032,7 +3032,7 @@
           <a:p>
             <a:fld id="{6CBA03CC-73C5-46A8-8DFB-B5DC4577D8E2}" type="datetimeFigureOut">
               <a:rPr lang="de-DE" smtClean="0"/>
-              <a:t>14.11.2021</a:t>
+              <a:t>15.11.2021</a:t>
             </a:fld>
             <a:endParaRPr lang="de-DE"/>
           </a:p>
@@ -3127,7 +3127,7 @@
           <a:p>
             <a:fld id="{6CBA03CC-73C5-46A8-8DFB-B5DC4577D8E2}" type="datetimeFigureOut">
               <a:rPr lang="de-DE" smtClean="0"/>
-              <a:t>14.11.2021</a:t>
+              <a:t>15.11.2021</a:t>
             </a:fld>
             <a:endParaRPr lang="de-DE"/>
           </a:p>
@@ -3404,7 +3404,7 @@
           <a:p>
             <a:fld id="{6CBA03CC-73C5-46A8-8DFB-B5DC4577D8E2}" type="datetimeFigureOut">
               <a:rPr lang="de-DE" smtClean="0"/>
-              <a:t>14.11.2021</a:t>
+              <a:t>15.11.2021</a:t>
             </a:fld>
             <a:endParaRPr lang="de-DE"/>
           </a:p>
@@ -3657,7 +3657,7 @@
           <a:p>
             <a:fld id="{6CBA03CC-73C5-46A8-8DFB-B5DC4577D8E2}" type="datetimeFigureOut">
               <a:rPr lang="de-DE" smtClean="0"/>
-              <a:t>14.11.2021</a:t>
+              <a:t>15.11.2021</a:t>
             </a:fld>
             <a:endParaRPr lang="de-DE"/>
           </a:p>
@@ -3870,7 +3870,7 @@
           <a:p>
             <a:fld id="{6CBA03CC-73C5-46A8-8DFB-B5DC4577D8E2}" type="datetimeFigureOut">
               <a:rPr lang="de-DE" smtClean="0"/>
-              <a:t>14.11.2021</a:t>
+              <a:t>15.11.2021</a:t>
             </a:fld>
             <a:endParaRPr lang="de-DE"/>
           </a:p>
@@ -4604,8 +4604,8 @@
           </a:p>
         </p:txBody>
       </p:sp>
-      <mc:AlternateContent xmlns:mc="http://schemas.openxmlformats.org/markup-compatibility/2006">
-        <mc:Choice xmlns:a14="http://schemas.microsoft.com/office/drawing/2010/main" Requires="a14">
+      <mc:AlternateContent xmlns:mc="http://schemas.openxmlformats.org/markup-compatibility/2006" xmlns:a14="http://schemas.microsoft.com/office/drawing/2010/main">
+        <mc:Choice Requires="a14">
           <p:sp>
             <p:nvSpPr>
               <p:cNvPr id="8" name="Rectangle 1"/>
@@ -4733,7 +4733,7 @@
                             <a:lumMod val="75000"/>
                           </a:schemeClr>
                         </a:solidFill>
-                        <a:latin typeface="Consolas" panose="020B0609020204030204" pitchFamily="49" charset="0"/>
+                        <a:latin typeface="Cambria Math" panose="02040503050406030204" pitchFamily="18" charset="0"/>
                       </a:rPr>
                       <m:t>"</m:t>
                     </m:r>
@@ -4759,7 +4759,7 @@
                             <a:lumMod val="75000"/>
                           </a:schemeClr>
                         </a:solidFill>
-                        <a:latin typeface="Consolas" panose="020B0609020204030204" pitchFamily="49" charset="0"/>
+                        <a:latin typeface="Cambria Math" panose="02040503050406030204" pitchFamily="18" charset="0"/>
                       </a:rPr>
                       <m:t>"</m:t>
                     </m:r>
@@ -4777,7 +4777,7 @@
             </p:txBody>
           </p:sp>
         </mc:Choice>
-        <mc:Fallback>
+        <mc:Fallback xmlns="">
           <p:sp>
             <p:nvSpPr>
               <p:cNvPr id="8" name="Rectangle 1"/>
@@ -6338,7 +6338,7 @@
           <a:p>
             <a:r>
               <a:rPr lang="de-DE" dirty="0" smtClean="0"/>
-              <a:t>Ressourcen Import</a:t>
+              <a:t>Import von Ressourcen</a:t>
             </a:r>
             <a:endParaRPr lang="de-DE" dirty="0"/>
           </a:p>
@@ -6408,6 +6408,40 @@
               <a:rPr lang="de-DE" dirty="0" smtClean="0"/>
               <a:t>)</a:t>
             </a:r>
+          </a:p>
+          <a:p>
+            <a:pPr lvl="1"/>
+            <a:r>
+              <a:rPr lang="de-DE" dirty="0" smtClean="0"/>
+              <a:t>Einige Tools unterstützen Import inkl. Generierung der Konfiguration</a:t>
+            </a:r>
+          </a:p>
+          <a:p>
+            <a:pPr lvl="2"/>
+            <a:r>
+              <a:rPr lang="de-DE" dirty="0" smtClean="0"/>
+              <a:t>z.B</a:t>
+            </a:r>
+            <a:r>
+              <a:rPr lang="de-DE" dirty="0"/>
+              <a:t>. </a:t>
+            </a:r>
+            <a:r>
+              <a:rPr lang="de-DE" dirty="0">
+                <a:hlinkClick r:id="rId4"/>
+              </a:rPr>
+              <a:t>http://terraforming.dtan4.net</a:t>
+            </a:r>
+            <a:r>
+              <a:rPr lang="de-DE" dirty="0" smtClean="0">
+                <a:hlinkClick r:id="rId4"/>
+              </a:rPr>
+              <a:t>/</a:t>
+            </a:r>
+            <a:endParaRPr lang="de-DE" dirty="0" smtClean="0"/>
+          </a:p>
+          <a:p>
+            <a:pPr lvl="2"/>
             <a:endParaRPr lang="de-DE" dirty="0"/>
           </a:p>
         </p:txBody>
@@ -6422,7 +6456,7 @@
         </p:nvSpPr>
         <p:spPr bwMode="auto">
           <a:xfrm>
-            <a:off x="1101688" y="5431612"/>
+            <a:off x="1101688" y="5541679"/>
             <a:ext cx="9988624" cy="533447"/>
           </a:xfrm>
           <a:prstGeom prst="rect">
@@ -6470,18 +6504,7 @@
                 </a:solidFill>
                 <a:latin typeface="Consolas" panose="020B0609020204030204" pitchFamily="49" charset="0"/>
               </a:rPr>
-              <a:t>&gt;</a:t>
-            </a:r>
-            <a:r>
-              <a:rPr lang="de-DE" altLang="de-DE" sz="2800" dirty="0">
-                <a:solidFill>
-                  <a:schemeClr val="bg1">
-                    <a:lumMod val="75000"/>
-                  </a:schemeClr>
-                </a:solidFill>
-                <a:latin typeface="Consolas" panose="020B0609020204030204" pitchFamily="49" charset="0"/>
-              </a:rPr>
-              <a:t> </a:t>
+              <a:t>&gt; </a:t>
             </a:r>
             <a:r>
               <a:rPr lang="de-DE" altLang="de-DE" sz="2800" dirty="0" err="1">

</xml_diff>